<commit_message>
changed 'freak' to 'burn'
</commit_message>
<xml_diff>
--- a/docs/design/overview/initial_project_pitch.pptx
+++ b/docs/design/overview/initial_project_pitch.pptx
@@ -1,6 +1,6 @@
 
 <file path=ppt/presentation.xml><?xml version="1.0" encoding="utf-8"?>
-<p:presentation xmlns:a="http://schemas.openxmlformats.org/drawingml/2006/main" xmlns:r="http://schemas.openxmlformats.org/officeDocument/2006/relationships" xmlns:p="http://schemas.openxmlformats.org/presentationml/2006/main" autoCompressPictures="0">
+<p:presentation xmlns:a="http://schemas.openxmlformats.org/drawingml/2006/main" xmlns:r="http://schemas.openxmlformats.org/officeDocument/2006/relationships" xmlns:mc="http://schemas.openxmlformats.org/markup-compatibility/2006" xmlns:mv="urn:schemas-microsoft-com:mac:vml" xmlns:p="http://schemas.openxmlformats.org/presentationml/2006/main" mc:Ignorable="mv" mc:PreserveAttributes="mv:*" autoCompressPictures="0">
   <p:sldMasterIdLst>
     <p:sldMasterId id="2147483648" r:id="rId1"/>
   </p:sldMasterIdLst>
@@ -113,7 +113,7 @@
 </file>
 
 <file path=ppt/slideLayouts/slideLayout1.xml><?xml version="1.0" encoding="utf-8"?>
-<p:sldLayout xmlns:a="http://schemas.openxmlformats.org/drawingml/2006/main" xmlns:r="http://schemas.openxmlformats.org/officeDocument/2006/relationships" xmlns:p="http://schemas.openxmlformats.org/presentationml/2006/main" showMasterSp="0" type="title" preserve="1">
+<p:sldLayout xmlns:a="http://schemas.openxmlformats.org/drawingml/2006/main" xmlns:r="http://schemas.openxmlformats.org/officeDocument/2006/relationships" xmlns:mc="http://schemas.openxmlformats.org/markup-compatibility/2006" xmlns:mv="urn:schemas-microsoft-com:mac:vml" xmlns:p="http://schemas.openxmlformats.org/presentationml/2006/main" mc:Ignorable="mv" mc:PreserveAttributes="mv:*" showMasterSp="0" type="title" preserve="1">
   <p:cSld name="Title Slide">
     <p:spTree>
       <p:nvGrpSpPr>
@@ -338,7 +338,8 @@
           <a:p>
             <a:fld id="{5A069CB8-F204-4D06-B913-C5A26A89888A}" type="datetimeFigureOut">
               <a:rPr lang="en-US" dirty="0"/>
-              <a:t>11/5/2013</a:t>
+              <a:pPr/>
+              <a:t>11/6/13</a:t>
             </a:fld>
             <a:endParaRPr lang="en-US" dirty="0"/>
           </a:p>
@@ -380,6 +381,7 @@
           <a:p>
             <a:fld id="{4FAB73BC-B049-4115-A692-8D63A059BFB8}" type="slidenum">
               <a:rPr lang="en-US" dirty="0"/>
+              <a:pPr/>
               <a:t>‹#›</a:t>
             </a:fld>
             <a:endParaRPr lang="en-US" dirty="0"/>
@@ -433,7 +435,7 @@
 </file>
 
 <file path=ppt/slideLayouts/slideLayout10.xml><?xml version="1.0" encoding="utf-8"?>
-<p:sldLayout xmlns:a="http://schemas.openxmlformats.org/drawingml/2006/main" xmlns:r="http://schemas.openxmlformats.org/officeDocument/2006/relationships" xmlns:p="http://schemas.openxmlformats.org/presentationml/2006/main" type="vertTx" preserve="1">
+<p:sldLayout xmlns:a="http://schemas.openxmlformats.org/drawingml/2006/main" xmlns:r="http://schemas.openxmlformats.org/officeDocument/2006/relationships" xmlns:mc="http://schemas.openxmlformats.org/markup-compatibility/2006" xmlns:mv="urn:schemas-microsoft-com:mac:vml" xmlns:p="http://schemas.openxmlformats.org/presentationml/2006/main" mc:Ignorable="mv" mc:PreserveAttributes="mv:*" type="vertTx" preserve="1">
   <p:cSld name="Title and Vertical Text">
     <p:spTree>
       <p:nvGrpSpPr>
@@ -541,7 +543,8 @@
           <a:p>
             <a:fld id="{50B6E300-0A13-4A81-945A-7333C271A069}" type="datetimeFigureOut">
               <a:rPr lang="en-US" dirty="0"/>
-              <a:t>11/5/2013</a:t>
+              <a:pPr/>
+              <a:t>11/6/13</a:t>
             </a:fld>
             <a:endParaRPr lang="en-US" dirty="0"/>
           </a:p>
@@ -583,6 +586,7 @@
           <a:p>
             <a:fld id="{4FAB73BC-B049-4115-A692-8D63A059BFB8}" type="slidenum">
               <a:rPr lang="en-US" dirty="0"/>
+              <a:pPr/>
               <a:t>‹#›</a:t>
             </a:fld>
             <a:endParaRPr lang="en-US" dirty="0"/>
@@ -598,7 +602,7 @@
 </file>
 
 <file path=ppt/slideLayouts/slideLayout11.xml><?xml version="1.0" encoding="utf-8"?>
-<p:sldLayout xmlns:a="http://schemas.openxmlformats.org/drawingml/2006/main" xmlns:r="http://schemas.openxmlformats.org/officeDocument/2006/relationships" xmlns:p="http://schemas.openxmlformats.org/presentationml/2006/main" showMasterSp="0" type="vertTitleAndTx" preserve="1">
+<p:sldLayout xmlns:a="http://schemas.openxmlformats.org/drawingml/2006/main" xmlns:r="http://schemas.openxmlformats.org/officeDocument/2006/relationships" xmlns:mc="http://schemas.openxmlformats.org/markup-compatibility/2006" xmlns:mv="urn:schemas-microsoft-com:mac:vml" xmlns:p="http://schemas.openxmlformats.org/presentationml/2006/main" mc:Ignorable="mv" mc:PreserveAttributes="mv:*" showMasterSp="0" type="vertTitleAndTx" preserve="1">
   <p:cSld name="Vertical Title and Text">
     <p:spTree>
       <p:nvGrpSpPr>
@@ -792,7 +796,8 @@
           <a:p>
             <a:fld id="{34671962-1EA4-46E7-BCB0-F36CE46D1A59}" type="datetimeFigureOut">
               <a:rPr lang="en-US" dirty="0"/>
-              <a:t>11/5/2013</a:t>
+              <a:pPr/>
+              <a:t>11/6/13</a:t>
             </a:fld>
             <a:endParaRPr lang="en-US" dirty="0"/>
           </a:p>
@@ -834,6 +839,7 @@
           <a:p>
             <a:fld id="{4FAB73BC-B049-4115-A692-8D63A059BFB8}" type="slidenum">
               <a:rPr lang="en-US" dirty="0"/>
+              <a:pPr/>
               <a:t>‹#›</a:t>
             </a:fld>
             <a:endParaRPr lang="en-US" dirty="0"/>
@@ -849,7 +855,7 @@
 </file>
 
 <file path=ppt/slideLayouts/slideLayout2.xml><?xml version="1.0" encoding="utf-8"?>
-<p:sldLayout xmlns:a="http://schemas.openxmlformats.org/drawingml/2006/main" xmlns:r="http://schemas.openxmlformats.org/officeDocument/2006/relationships" xmlns:p="http://schemas.openxmlformats.org/presentationml/2006/main" type="obj" preserve="1">
+<p:sldLayout xmlns:a="http://schemas.openxmlformats.org/drawingml/2006/main" xmlns:r="http://schemas.openxmlformats.org/officeDocument/2006/relationships" xmlns:mc="http://schemas.openxmlformats.org/markup-compatibility/2006" xmlns:mv="urn:schemas-microsoft-com:mac:vml" xmlns:p="http://schemas.openxmlformats.org/presentationml/2006/main" mc:Ignorable="mv" mc:PreserveAttributes="mv:*" type="obj" preserve="1">
   <p:cSld name="Title and Content">
     <p:spTree>
       <p:nvGrpSpPr>
@@ -957,7 +963,8 @@
           <a:p>
             <a:fld id="{D30BB376-B19C-488D-ABEB-03C7E6E9E3E0}" type="datetimeFigureOut">
               <a:rPr lang="en-US" dirty="0"/>
-              <a:t>11/5/2013</a:t>
+              <a:pPr/>
+              <a:t>11/6/13</a:t>
             </a:fld>
             <a:endParaRPr lang="en-US" dirty="0"/>
           </a:p>
@@ -999,6 +1006,7 @@
           <a:p>
             <a:fld id="{629637A9-119A-49DA-BD12-AAC58B377D80}" type="slidenum">
               <a:rPr lang="en-US" dirty="0"/>
+              <a:pPr/>
               <a:t>‹#›</a:t>
             </a:fld>
             <a:endParaRPr lang="en-US" dirty="0"/>
@@ -1014,7 +1022,7 @@
 </file>
 
 <file path=ppt/slideLayouts/slideLayout3.xml><?xml version="1.0" encoding="utf-8"?>
-<p:sldLayout xmlns:a="http://schemas.openxmlformats.org/drawingml/2006/main" xmlns:r="http://schemas.openxmlformats.org/officeDocument/2006/relationships" xmlns:p="http://schemas.openxmlformats.org/presentationml/2006/main" showMasterSp="0" type="secHead" preserve="1">
+<p:sldLayout xmlns:a="http://schemas.openxmlformats.org/drawingml/2006/main" xmlns:r="http://schemas.openxmlformats.org/officeDocument/2006/relationships" xmlns:mc="http://schemas.openxmlformats.org/markup-compatibility/2006" xmlns:mv="urn:schemas-microsoft-com:mac:vml" xmlns:p="http://schemas.openxmlformats.org/presentationml/2006/main" mc:Ignorable="mv" mc:PreserveAttributes="mv:*" showMasterSp="0" type="secHead" preserve="1">
   <p:cSld name="Section Header">
     <p:bg>
       <p:bgPr>
@@ -1295,7 +1303,8 @@
           <a:p>
             <a:fld id="{486F077B-A50F-4D64-8574-E2D6A98A5553}" type="datetimeFigureOut">
               <a:rPr lang="en-US" dirty="0"/>
-              <a:t>11/5/2013</a:t>
+              <a:pPr/>
+              <a:t>11/6/13</a:t>
             </a:fld>
             <a:endParaRPr lang="en-US" dirty="0"/>
           </a:p>
@@ -1337,6 +1346,7 @@
           <a:p>
             <a:fld id="{4FAB73BC-B049-4115-A692-8D63A059BFB8}" type="slidenum">
               <a:rPr lang="en-US" dirty="0"/>
+              <a:pPr/>
               <a:t>‹#›</a:t>
             </a:fld>
             <a:endParaRPr lang="en-US" dirty="0"/>
@@ -1390,7 +1400,7 @@
 </file>
 
 <file path=ppt/slideLayouts/slideLayout4.xml><?xml version="1.0" encoding="utf-8"?>
-<p:sldLayout xmlns:a="http://schemas.openxmlformats.org/drawingml/2006/main" xmlns:r="http://schemas.openxmlformats.org/officeDocument/2006/relationships" xmlns:p="http://schemas.openxmlformats.org/presentationml/2006/main" type="twoObj" preserve="1">
+<p:sldLayout xmlns:a="http://schemas.openxmlformats.org/drawingml/2006/main" xmlns:r="http://schemas.openxmlformats.org/officeDocument/2006/relationships" xmlns:mc="http://schemas.openxmlformats.org/markup-compatibility/2006" xmlns:mv="urn:schemas-microsoft-com:mac:vml" xmlns:p="http://schemas.openxmlformats.org/presentationml/2006/main" mc:Ignorable="mv" mc:PreserveAttributes="mv:*" type="twoObj" preserve="1">
   <p:cSld name="Two Content">
     <p:spTree>
       <p:nvGrpSpPr>
@@ -1565,7 +1575,8 @@
           <a:p>
             <a:fld id="{7D9E2A62-1983-43A1-A163-D8AA46534C80}" type="datetimeFigureOut">
               <a:rPr lang="en-US" dirty="0"/>
-              <a:t>11/5/2013</a:t>
+              <a:pPr/>
+              <a:t>11/6/13</a:t>
             </a:fld>
             <a:endParaRPr lang="en-US" dirty="0"/>
           </a:p>
@@ -1607,6 +1618,7 @@
           <a:p>
             <a:fld id="{4FAB73BC-B049-4115-A692-8D63A059BFB8}" type="slidenum">
               <a:rPr lang="en-US" dirty="0"/>
+              <a:pPr/>
               <a:t>‹#›</a:t>
             </a:fld>
             <a:endParaRPr lang="en-US" dirty="0"/>
@@ -1622,7 +1634,7 @@
 </file>
 
 <file path=ppt/slideLayouts/slideLayout5.xml><?xml version="1.0" encoding="utf-8"?>
-<p:sldLayout xmlns:a="http://schemas.openxmlformats.org/drawingml/2006/main" xmlns:r="http://schemas.openxmlformats.org/officeDocument/2006/relationships" xmlns:p="http://schemas.openxmlformats.org/presentationml/2006/main" type="twoTxTwoObj" preserve="1">
+<p:sldLayout xmlns:a="http://schemas.openxmlformats.org/drawingml/2006/main" xmlns:r="http://schemas.openxmlformats.org/officeDocument/2006/relationships" xmlns:mc="http://schemas.openxmlformats.org/markup-compatibility/2006" xmlns:mv="urn:schemas-microsoft-com:mac:vml" xmlns:p="http://schemas.openxmlformats.org/presentationml/2006/main" mc:Ignorable="mv" mc:PreserveAttributes="mv:*" type="twoTxTwoObj" preserve="1">
   <p:cSld name="Comparison">
     <p:spTree>
       <p:nvGrpSpPr>
@@ -1939,7 +1951,8 @@
           <a:p>
             <a:fld id="{898F3E3B-34E3-4345-B2A1-994B83598A9C}" type="datetimeFigureOut">
               <a:rPr lang="en-US" dirty="0"/>
-              <a:t>11/5/2013</a:t>
+              <a:pPr/>
+              <a:t>11/6/13</a:t>
             </a:fld>
             <a:endParaRPr lang="en-US" dirty="0"/>
           </a:p>
@@ -1981,6 +1994,7 @@
           <a:p>
             <a:fld id="{4FAB73BC-B049-4115-A692-8D63A059BFB8}" type="slidenum">
               <a:rPr lang="en-US" dirty="0"/>
+              <a:pPr/>
               <a:t>‹#›</a:t>
             </a:fld>
             <a:endParaRPr lang="en-US" dirty="0"/>
@@ -1996,7 +2010,7 @@
 </file>
 
 <file path=ppt/slideLayouts/slideLayout6.xml><?xml version="1.0" encoding="utf-8"?>
-<p:sldLayout xmlns:a="http://schemas.openxmlformats.org/drawingml/2006/main" xmlns:r="http://schemas.openxmlformats.org/officeDocument/2006/relationships" xmlns:p="http://schemas.openxmlformats.org/presentationml/2006/main" type="titleOnly" preserve="1">
+<p:sldLayout xmlns:a="http://schemas.openxmlformats.org/drawingml/2006/main" xmlns:r="http://schemas.openxmlformats.org/officeDocument/2006/relationships" xmlns:mc="http://schemas.openxmlformats.org/markup-compatibility/2006" xmlns:mv="urn:schemas-microsoft-com:mac:vml" xmlns:p="http://schemas.openxmlformats.org/presentationml/2006/main" mc:Ignorable="mv" mc:PreserveAttributes="mv:*" type="titleOnly" preserve="1">
   <p:cSld name="Title Only">
     <p:spTree>
       <p:nvGrpSpPr>
@@ -2052,7 +2066,8 @@
           <a:p>
             <a:fld id="{FD816C96-82A1-4D77-8ADA-627AC6FE3D65}" type="datetimeFigureOut">
               <a:rPr lang="en-US" dirty="0"/>
-              <a:t>11/5/2013</a:t>
+              <a:pPr/>
+              <a:t>11/6/13</a:t>
             </a:fld>
             <a:endParaRPr lang="en-US" dirty="0"/>
           </a:p>
@@ -2094,6 +2109,7 @@
           <a:p>
             <a:fld id="{4FAB73BC-B049-4115-A692-8D63A059BFB8}" type="slidenum">
               <a:rPr lang="en-US" dirty="0"/>
+              <a:pPr/>
               <a:t>‹#›</a:t>
             </a:fld>
             <a:endParaRPr lang="en-US" dirty="0"/>
@@ -2109,7 +2125,7 @@
 </file>
 
 <file path=ppt/slideLayouts/slideLayout7.xml><?xml version="1.0" encoding="utf-8"?>
-<p:sldLayout xmlns:a="http://schemas.openxmlformats.org/drawingml/2006/main" xmlns:r="http://schemas.openxmlformats.org/officeDocument/2006/relationships" xmlns:p="http://schemas.openxmlformats.org/presentationml/2006/main" showMasterSp="0" type="blank" preserve="1">
+<p:sldLayout xmlns:a="http://schemas.openxmlformats.org/drawingml/2006/main" xmlns:r="http://schemas.openxmlformats.org/officeDocument/2006/relationships" xmlns:mc="http://schemas.openxmlformats.org/markup-compatibility/2006" xmlns:mv="urn:schemas-microsoft-com:mac:vml" xmlns:p="http://schemas.openxmlformats.org/presentationml/2006/main" mc:Ignorable="mv" mc:PreserveAttributes="mv:*" showMasterSp="0" type="blank" preserve="1">
   <p:cSld name="Blank">
     <p:spTree>
       <p:nvGrpSpPr>
@@ -2218,7 +2234,8 @@
           <a:p>
             <a:fld id="{1D102C1E-28F2-47E9-802D-339E64E2F920}" type="datetimeFigureOut">
               <a:rPr lang="en-US" dirty="0"/>
-              <a:t>11/5/2013</a:t>
+              <a:pPr/>
+              <a:t>11/6/13</a:t>
             </a:fld>
             <a:endParaRPr lang="en-US" dirty="0"/>
           </a:p>
@@ -2284,7 +2301,7 @@
 </file>
 
 <file path=ppt/slideLayouts/slideLayout8.xml><?xml version="1.0" encoding="utf-8"?>
-<p:sldLayout xmlns:a="http://schemas.openxmlformats.org/drawingml/2006/main" xmlns:r="http://schemas.openxmlformats.org/officeDocument/2006/relationships" xmlns:p="http://schemas.openxmlformats.org/presentationml/2006/main" showMasterSp="0" type="objTx" preserve="1">
+<p:sldLayout xmlns:a="http://schemas.openxmlformats.org/drawingml/2006/main" xmlns:r="http://schemas.openxmlformats.org/officeDocument/2006/relationships" xmlns:mc="http://schemas.openxmlformats.org/markup-compatibility/2006" xmlns:mv="urn:schemas-microsoft-com:mac:vml" xmlns:p="http://schemas.openxmlformats.org/presentationml/2006/main" mc:Ignorable="mv" mc:PreserveAttributes="mv:*" showMasterSp="0" type="objTx" preserve="1">
   <p:cSld name="Content with Caption">
     <p:spTree>
       <p:nvGrpSpPr>
@@ -2568,7 +2585,8 @@
           <a:p>
             <a:fld id="{24271A48-F18A-45B3-BC05-1E27DA3F88AF}" type="datetimeFigureOut">
               <a:rPr lang="en-US" dirty="0"/>
-              <a:t>11/5/2013</a:t>
+              <a:pPr/>
+              <a:t>11/6/13</a:t>
             </a:fld>
             <a:endParaRPr lang="en-US" dirty="0"/>
           </a:p>
@@ -2647,7 +2665,7 @@
 </file>
 
 <file path=ppt/slideLayouts/slideLayout9.xml><?xml version="1.0" encoding="utf-8"?>
-<p:sldLayout xmlns:a="http://schemas.openxmlformats.org/drawingml/2006/main" xmlns:r="http://schemas.openxmlformats.org/officeDocument/2006/relationships" xmlns:p="http://schemas.openxmlformats.org/presentationml/2006/main" showMasterSp="0" type="picTx" preserve="1">
+<p:sldLayout xmlns:a="http://schemas.openxmlformats.org/drawingml/2006/main" xmlns:r="http://schemas.openxmlformats.org/officeDocument/2006/relationships" xmlns:mc="http://schemas.openxmlformats.org/markup-compatibility/2006" xmlns:mv="urn:schemas-microsoft-com:mac:vml" xmlns:p="http://schemas.openxmlformats.org/presentationml/2006/main" mc:Ignorable="mv" mc:PreserveAttributes="mv:*" showMasterSp="0" type="picTx" preserve="1">
   <p:cSld name="Picture with Caption">
     <p:spTree>
       <p:nvGrpSpPr>
@@ -2941,7 +2959,8 @@
           <a:p>
             <a:fld id="{65B747F8-9654-4282-85D2-65F41AAE7A75}" type="datetimeFigureOut">
               <a:rPr lang="en-US" dirty="0"/>
-              <a:t>11/5/2013</a:t>
+              <a:pPr/>
+              <a:t>11/6/13</a:t>
             </a:fld>
             <a:endParaRPr lang="en-US" dirty="0"/>
           </a:p>
@@ -2983,6 +3002,7 @@
           <a:p>
             <a:fld id="{4FAB73BC-B049-4115-A692-8D63A059BFB8}" type="slidenum">
               <a:rPr lang="en-US" dirty="0"/>
+              <a:pPr/>
               <a:t>‹#›</a:t>
             </a:fld>
             <a:endParaRPr lang="en-US" dirty="0"/>
@@ -2998,7 +3018,7 @@
 </file>
 
 <file path=ppt/slideMasters/slideMaster1.xml><?xml version="1.0" encoding="utf-8"?>
-<p:sldMaster xmlns:a="http://schemas.openxmlformats.org/drawingml/2006/main" xmlns:r="http://schemas.openxmlformats.org/officeDocument/2006/relationships" xmlns:p="http://schemas.openxmlformats.org/presentationml/2006/main">
+<p:sldMaster xmlns:a="http://schemas.openxmlformats.org/drawingml/2006/main" xmlns:r="http://schemas.openxmlformats.org/officeDocument/2006/relationships" xmlns:mc="http://schemas.openxmlformats.org/markup-compatibility/2006" xmlns:mv="urn:schemas-microsoft-com:mac:vml" xmlns:p="http://schemas.openxmlformats.org/presentationml/2006/main" mc:Ignorable="mv" mc:PreserveAttributes="mv:*">
   <p:cSld>
     <p:bg>
       <p:bgRef idx="1001">
@@ -3223,7 +3243,8 @@
           <a:p>
             <a:fld id="{5DC5B261-8843-42D1-AAFC-05E20E2D9B97}" type="datetimeFigureOut">
               <a:rPr lang="en-US" dirty="0"/>
-              <a:t>11/5/2013</a:t>
+              <a:pPr/>
+              <a:t>11/6/13</a:t>
             </a:fld>
             <a:endParaRPr lang="en-US" dirty="0"/>
           </a:p>
@@ -3728,7 +3749,7 @@
 </file>
 
 <file path=ppt/slides/slide1.xml><?xml version="1.0" encoding="utf-8"?>
-<p:sld xmlns:a="http://schemas.openxmlformats.org/drawingml/2006/main" xmlns:r="http://schemas.openxmlformats.org/officeDocument/2006/relationships" xmlns:p="http://schemas.openxmlformats.org/presentationml/2006/main">
+<p:sld xmlns:a="http://schemas.openxmlformats.org/drawingml/2006/main" xmlns:r="http://schemas.openxmlformats.org/officeDocument/2006/relationships" xmlns:mc="http://schemas.openxmlformats.org/markup-compatibility/2006" xmlns:mv="urn:schemas-microsoft-com:mac:vml" xmlns:p="http://schemas.openxmlformats.org/presentationml/2006/main" mc:Ignorable="mv" mc:PreserveAttributes="mv:*">
   <p:cSld>
     <p:spTree>
       <p:nvGrpSpPr>
@@ -3776,7 +3797,37 @@
               <a:rPr lang="en-US" sz="4400" i="1" dirty="0" smtClean="0">
                 <a:latin typeface="Gill Sans MT Pro Light" panose="020B0302020104020203" pitchFamily="34" charset="0"/>
               </a:rPr>
-              <a:t>The TODO list that doesn’t freak you out</a:t>
+              <a:t>The TODO list that </a:t>
+            </a:r>
+            <a:r>
+              <a:rPr lang="en-US" sz="4400" i="1" smtClean="0">
+                <a:latin typeface="Gill Sans MT Pro Light" panose="020B0302020104020203" pitchFamily="34" charset="0"/>
+              </a:rPr>
+              <a:t>doesn’t</a:t>
+            </a:r>
+            <a:r>
+              <a:rPr lang="en-US" sz="4400" i="1" smtClean="0">
+                <a:latin typeface="Gill Sans MT Pro Light" panose="020B0302020104020203" pitchFamily="34" charset="0"/>
+              </a:rPr>
+              <a:t> </a:t>
+            </a:r>
+            <a:r>
+              <a:rPr lang="en-US" sz="4400" i="1" smtClean="0">
+                <a:latin typeface="Gill Sans MT Pro Light" panose="020B0302020104020203" pitchFamily="34" charset="0"/>
+              </a:rPr>
+              <a:t>burn</a:t>
+            </a:r>
+            <a:r>
+              <a:rPr lang="en-US" sz="4400" i="1" smtClean="0">
+                <a:latin typeface="Gill Sans MT Pro Light" panose="020B0302020104020203" pitchFamily="34" charset="0"/>
+              </a:rPr>
+              <a:t> </a:t>
+            </a:r>
+            <a:r>
+              <a:rPr lang="en-US" sz="4400" i="1" dirty="0" smtClean="0">
+                <a:latin typeface="Gill Sans MT Pro Light" panose="020B0302020104020203" pitchFamily="34" charset="0"/>
+              </a:rPr>
+              <a:t>you out</a:t>
             </a:r>
             <a:r>
               <a:rPr lang="en-US" sz="4400" dirty="0" smtClean="0">
@@ -3888,7 +3939,7 @@
     </p:spTree>
     <p:extLst>
       <p:ext uri="{BB962C8B-B14F-4D97-AF65-F5344CB8AC3E}">
-        <p14:creationId xmlns:p14="http://schemas.microsoft.com/office/powerpoint/2010/main" val="1729870499"/>
+        <p14:creationId xmlns:p14="http://schemas.microsoft.com/office/powerpoint/2010/main" xmlns:p="http://schemas.openxmlformats.org/presentationml/2006/main" xmlns:r="http://schemas.openxmlformats.org/officeDocument/2006/relationships" xmlns:a="http://schemas.openxmlformats.org/drawingml/2006/main" xmlns="" val="1729870499"/>
       </p:ext>
     </p:extLst>
   </p:cSld>
@@ -3906,7 +3957,7 @@
 </file>
 
 <file path=ppt/slides/slide2.xml><?xml version="1.0" encoding="utf-8"?>
-<p:sld xmlns:a="http://schemas.openxmlformats.org/drawingml/2006/main" xmlns:r="http://schemas.openxmlformats.org/officeDocument/2006/relationships" xmlns:p="http://schemas.openxmlformats.org/presentationml/2006/main">
+<p:sld xmlns:a="http://schemas.openxmlformats.org/drawingml/2006/main" xmlns:r="http://schemas.openxmlformats.org/officeDocument/2006/relationships" xmlns:mc="http://schemas.openxmlformats.org/markup-compatibility/2006" xmlns:mv="urn:schemas-microsoft-com:mac:vml" xmlns:p="http://schemas.openxmlformats.org/presentationml/2006/main" mc:Ignorable="mv" mc:PreserveAttributes="mv:*">
   <p:cSld>
     <p:spTree>
       <p:nvGrpSpPr>
@@ -3934,7 +3985,7 @@
           <a:blip r:embed="rId2">
             <a:extLst>
               <a:ext uri="{28A0092B-C50C-407E-A947-70E740481C1C}">
-                <a14:useLocalDpi xmlns:a14="http://schemas.microsoft.com/office/drawing/2010/main" val="0"/>
+                <a14:useLocalDpi xmlns:a14="http://schemas.microsoft.com/office/drawing/2010/main" xmlns:p="http://schemas.openxmlformats.org/presentationml/2006/main" xmlns:r="http://schemas.openxmlformats.org/officeDocument/2006/relationships" xmlns:a="http://schemas.openxmlformats.org/drawingml/2006/main" xmlns="" val="0"/>
               </a:ext>
             </a:extLst>
           </a:blip>
@@ -3955,7 +4006,7 @@
     </p:spTree>
     <p:extLst>
       <p:ext uri="{BB962C8B-B14F-4D97-AF65-F5344CB8AC3E}">
-        <p14:creationId xmlns:p14="http://schemas.microsoft.com/office/powerpoint/2010/main" val="2068488761"/>
+        <p14:creationId xmlns:p14="http://schemas.microsoft.com/office/powerpoint/2010/main" xmlns:p="http://schemas.openxmlformats.org/presentationml/2006/main" xmlns:r="http://schemas.openxmlformats.org/officeDocument/2006/relationships" xmlns:a="http://schemas.openxmlformats.org/drawingml/2006/main" xmlns="" val="2068488761"/>
       </p:ext>
     </p:extLst>
   </p:cSld>
@@ -3973,7 +4024,7 @@
 </file>
 
 <file path=ppt/slides/slide3.xml><?xml version="1.0" encoding="utf-8"?>
-<p:sld xmlns:a="http://schemas.openxmlformats.org/drawingml/2006/main" xmlns:r="http://schemas.openxmlformats.org/officeDocument/2006/relationships" xmlns:p="http://schemas.openxmlformats.org/presentationml/2006/main">
+<p:sld xmlns:a="http://schemas.openxmlformats.org/drawingml/2006/main" xmlns:r="http://schemas.openxmlformats.org/officeDocument/2006/relationships" xmlns:mc="http://schemas.openxmlformats.org/markup-compatibility/2006" xmlns:mv="urn:schemas-microsoft-com:mac:vml" xmlns:p="http://schemas.openxmlformats.org/presentationml/2006/main" mc:Ignorable="mv" mc:PreserveAttributes="mv:*">
   <p:cSld>
     <p:spTree>
       <p:nvGrpSpPr>
@@ -4141,7 +4192,7 @@
     </p:spTree>
     <p:extLst>
       <p:ext uri="{BB962C8B-B14F-4D97-AF65-F5344CB8AC3E}">
-        <p14:creationId xmlns:p14="http://schemas.microsoft.com/office/powerpoint/2010/main" val="3188917720"/>
+        <p14:creationId xmlns:p14="http://schemas.microsoft.com/office/powerpoint/2010/main" xmlns:p="http://schemas.openxmlformats.org/presentationml/2006/main" xmlns:r="http://schemas.openxmlformats.org/officeDocument/2006/relationships" xmlns:a="http://schemas.openxmlformats.org/drawingml/2006/main" xmlns="" val="3188917720"/>
       </p:ext>
     </p:extLst>
   </p:cSld>
@@ -4159,7 +4210,7 @@
 </file>
 
 <file path=ppt/slides/slide4.xml><?xml version="1.0" encoding="utf-8"?>
-<p:sld xmlns:a="http://schemas.openxmlformats.org/drawingml/2006/main" xmlns:r="http://schemas.openxmlformats.org/officeDocument/2006/relationships" xmlns:p="http://schemas.openxmlformats.org/presentationml/2006/main">
+<p:sld xmlns:a="http://schemas.openxmlformats.org/drawingml/2006/main" xmlns:r="http://schemas.openxmlformats.org/officeDocument/2006/relationships" xmlns:mc="http://schemas.openxmlformats.org/markup-compatibility/2006" xmlns:mv="urn:schemas-microsoft-com:mac:vml" xmlns:p="http://schemas.openxmlformats.org/presentationml/2006/main" mc:Ignorable="mv" mc:PreserveAttributes="mv:*">
   <p:cSld>
     <p:spTree>
       <p:nvGrpSpPr>
@@ -4298,7 +4349,7 @@
     </p:spTree>
     <p:extLst>
       <p:ext uri="{BB962C8B-B14F-4D97-AF65-F5344CB8AC3E}">
-        <p14:creationId xmlns:p14="http://schemas.microsoft.com/office/powerpoint/2010/main" val="1065805020"/>
+        <p14:creationId xmlns:p14="http://schemas.microsoft.com/office/powerpoint/2010/main" xmlns:p="http://schemas.openxmlformats.org/presentationml/2006/main" xmlns:r="http://schemas.openxmlformats.org/officeDocument/2006/relationships" xmlns:a="http://schemas.openxmlformats.org/drawingml/2006/main" xmlns="" val="1065805020"/>
       </p:ext>
     </p:extLst>
   </p:cSld>
@@ -4316,7 +4367,7 @@
 </file>
 
 <file path=ppt/slides/slide5.xml><?xml version="1.0" encoding="utf-8"?>
-<p:sld xmlns:a="http://schemas.openxmlformats.org/drawingml/2006/main" xmlns:r="http://schemas.openxmlformats.org/officeDocument/2006/relationships" xmlns:p="http://schemas.openxmlformats.org/presentationml/2006/main">
+<p:sld xmlns:a="http://schemas.openxmlformats.org/drawingml/2006/main" xmlns:r="http://schemas.openxmlformats.org/officeDocument/2006/relationships" xmlns:mc="http://schemas.openxmlformats.org/markup-compatibility/2006" xmlns:mv="urn:schemas-microsoft-com:mac:vml" xmlns:p="http://schemas.openxmlformats.org/presentationml/2006/main" mc:Ignorable="mv" mc:PreserveAttributes="mv:*">
   <p:cSld>
     <p:spTree>
       <p:nvGrpSpPr>
@@ -4344,7 +4395,7 @@
           <a:blip r:embed="rId2">
             <a:extLst>
               <a:ext uri="{28A0092B-C50C-407E-A947-70E740481C1C}">
-                <a14:useLocalDpi xmlns:a14="http://schemas.microsoft.com/office/drawing/2010/main" val="0"/>
+                <a14:useLocalDpi xmlns:a14="http://schemas.microsoft.com/office/drawing/2010/main" xmlns:p="http://schemas.openxmlformats.org/presentationml/2006/main" xmlns:r="http://schemas.openxmlformats.org/officeDocument/2006/relationships" xmlns:a="http://schemas.openxmlformats.org/drawingml/2006/main" xmlns="" val="0"/>
               </a:ext>
             </a:extLst>
           </a:blip>
@@ -4365,7 +4416,7 @@
     </p:spTree>
     <p:extLst>
       <p:ext uri="{BB962C8B-B14F-4D97-AF65-F5344CB8AC3E}">
-        <p14:creationId xmlns:p14="http://schemas.microsoft.com/office/powerpoint/2010/main" val="2284701268"/>
+        <p14:creationId xmlns:p14="http://schemas.microsoft.com/office/powerpoint/2010/main" xmlns:p="http://schemas.openxmlformats.org/presentationml/2006/main" xmlns:r="http://schemas.openxmlformats.org/officeDocument/2006/relationships" xmlns:a="http://schemas.openxmlformats.org/drawingml/2006/main" xmlns="" val="2284701268"/>
       </p:ext>
     </p:extLst>
   </p:cSld>
@@ -4383,7 +4434,7 @@
 </file>
 
 <file path=ppt/slides/slide6.xml><?xml version="1.0" encoding="utf-8"?>
-<p:sld xmlns:a="http://schemas.openxmlformats.org/drawingml/2006/main" xmlns:r="http://schemas.openxmlformats.org/officeDocument/2006/relationships" xmlns:p="http://schemas.openxmlformats.org/presentationml/2006/main">
+<p:sld xmlns:a="http://schemas.openxmlformats.org/drawingml/2006/main" xmlns:r="http://schemas.openxmlformats.org/officeDocument/2006/relationships" xmlns:mc="http://schemas.openxmlformats.org/markup-compatibility/2006" xmlns:mv="urn:schemas-microsoft-com:mac:vml" xmlns:p="http://schemas.openxmlformats.org/presentationml/2006/main" mc:Ignorable="mv" mc:PreserveAttributes="mv:*">
   <p:cSld>
     <p:spTree>
       <p:nvGrpSpPr>
@@ -4434,7 +4485,7 @@
           <a:blip r:embed="rId2">
             <a:extLst>
               <a:ext uri="{28A0092B-C50C-407E-A947-70E740481C1C}">
-                <a14:useLocalDpi xmlns:a14="http://schemas.microsoft.com/office/drawing/2010/main" val="0"/>
+                <a14:useLocalDpi xmlns:a14="http://schemas.microsoft.com/office/drawing/2010/main" xmlns:p="http://schemas.openxmlformats.org/presentationml/2006/main" xmlns:r="http://schemas.openxmlformats.org/officeDocument/2006/relationships" xmlns:a="http://schemas.openxmlformats.org/drawingml/2006/main" xmlns="" val="0"/>
               </a:ext>
             </a:extLst>
           </a:blip>
@@ -4502,7 +4553,7 @@
           <a:blip r:embed="rId4">
             <a:extLst>
               <a:ext uri="{28A0092B-C50C-407E-A947-70E740481C1C}">
-                <a14:useLocalDpi xmlns:a14="http://schemas.microsoft.com/office/drawing/2010/main" val="0"/>
+                <a14:useLocalDpi xmlns:a14="http://schemas.microsoft.com/office/drawing/2010/main" xmlns:p="http://schemas.openxmlformats.org/presentationml/2006/main" xmlns:r="http://schemas.openxmlformats.org/officeDocument/2006/relationships" xmlns:a="http://schemas.openxmlformats.org/drawingml/2006/main" xmlns="" val="0"/>
               </a:ext>
             </a:extLst>
           </a:blip>
@@ -4523,7 +4574,7 @@
     </p:spTree>
     <p:extLst>
       <p:ext uri="{BB962C8B-B14F-4D97-AF65-F5344CB8AC3E}">
-        <p14:creationId xmlns:p14="http://schemas.microsoft.com/office/powerpoint/2010/main" val="501813197"/>
+        <p14:creationId xmlns:p14="http://schemas.microsoft.com/office/powerpoint/2010/main" xmlns:p="http://schemas.openxmlformats.org/presentationml/2006/main" xmlns:r="http://schemas.openxmlformats.org/officeDocument/2006/relationships" xmlns:a="http://schemas.openxmlformats.org/drawingml/2006/main" xmlns="" val="501813197"/>
       </p:ext>
     </p:extLst>
   </p:cSld>
@@ -4583,7 +4634,7 @@
     </a:clrScheme>
     <a:fontScheme name="Retrospect">
       <a:majorFont>
-        <a:latin typeface="Calibri Light" panose="020F0302020204030204"/>
+        <a:latin typeface="Calibri Light"/>
         <a:ea typeface=""/>
         <a:cs typeface=""/>
         <a:font script="Jpan" typeface="ＭＳ Ｐゴシック"/>
@@ -4618,7 +4669,7 @@
         <a:font script="Geor" typeface="Sylfaen"/>
       </a:majorFont>
       <a:minorFont>
-        <a:latin typeface="Calibri" panose="020F0502020204030204"/>
+        <a:latin typeface="Calibri"/>
         <a:ea typeface=""/>
         <a:cs typeface=""/>
         <a:font script="Jpan" typeface="ＭＳ Ｐゴシック"/>
@@ -4817,7 +4868,7 @@
   <a:extraClrSchemeLst/>
   <a:extLst>
     <a:ext uri="{05A4C25C-085E-4340-85A3-A5531E510DB2}">
-      <thm15:themeFamily xmlns:thm15="http://schemas.microsoft.com/office/thememl/2012/main" name="Retrospect" id="{5F128B03-DCCA-4EEB-AB3B-CF2899314A46}" vid="{D26EA377-59BD-4C9C-9D94-EE8416EE4C79}"/>
+      <thm15:themeFamily xmlns:thm15="http://schemas.microsoft.com/office/thememl/2012/main" xmlns:a="http://schemas.openxmlformats.org/drawingml/2006/main" xmlns="" name="Retrospect" id="{5F128B03-DCCA-4EEB-AB3B-CF2899314A46}" vid="{D26EA377-59BD-4C9C-9D94-EE8416EE4C79}"/>
     </a:ext>
   </a:extLst>
 </a:theme>

</xml_diff>